<commit_message>
BSides Austin - December 2024
</commit_message>
<xml_diff>
--- a/Documentation/BSides Austin - December 2024 - Rodney Beede.pptx
+++ b/Documentation/BSides Austin - December 2024 - Rodney Beede.pptx
@@ -15,8 +15,10 @@
     <p:sldId id="258" r:id="rId9"/>
     <p:sldId id="297" r:id="rId10"/>
     <p:sldId id="291" r:id="rId11"/>
-    <p:sldId id="296" r:id="rId12"/>
-    <p:sldId id="302" r:id="rId13"/>
+    <p:sldId id="303" r:id="rId12"/>
+    <p:sldId id="304" r:id="rId13"/>
+    <p:sldId id="296" r:id="rId14"/>
+    <p:sldId id="302" r:id="rId15"/>
   </p:sldIdLst>
   <p:sldSz cx="12192000" cy="6858000"/>
   <p:notesSz cx="6858000" cy="9144000"/>
@@ -2884,6 +2886,344 @@
           <p:cNvPr id="2" name="Title 1">
             <a:extLst>
               <a:ext uri="{FF2B5EF4-FFF2-40B4-BE49-F238E27FC236}">
+                <a16:creationId xmlns:a16="http://schemas.microsoft.com/office/drawing/2014/main" id="{F59BA85C-E6BC-61CE-0654-43936E7EEAC4}"/>
+              </a:ext>
+            </a:extLst>
+          </p:cNvPr>
+          <p:cNvSpPr>
+            <a:spLocks noGrp="1"/>
+          </p:cNvSpPr>
+          <p:nvPr>
+            <p:ph type="title"/>
+          </p:nvPr>
+        </p:nvSpPr>
+        <p:spPr/>
+        <p:txBody>
+          <a:bodyPr/>
+          <a:lstStyle/>
+          <a:p>
+            <a:r>
+              <a:rPr lang="en-US" dirty="0"/>
+              <a:t>Salesforce Knowledge Tips</a:t>
+            </a:r>
+          </a:p>
+        </p:txBody>
+      </p:sp>
+      <p:sp>
+        <p:nvSpPr>
+          <p:cNvPr id="3" name="Content Placeholder 2">
+            <a:extLst>
+              <a:ext uri="{FF2B5EF4-FFF2-40B4-BE49-F238E27FC236}">
+                <a16:creationId xmlns:a16="http://schemas.microsoft.com/office/drawing/2014/main" id="{AA1EBE08-5EF6-EF6D-2BF9-3DCD1515CAE4}"/>
+              </a:ext>
+            </a:extLst>
+          </p:cNvPr>
+          <p:cNvSpPr>
+            <a:spLocks noGrp="1"/>
+          </p:cNvSpPr>
+          <p:nvPr>
+            <p:ph idx="1"/>
+          </p:nvPr>
+        </p:nvSpPr>
+        <p:spPr/>
+        <p:txBody>
+          <a:bodyPr>
+            <a:normAutofit/>
+          </a:bodyPr>
+          <a:lstStyle/>
+          <a:p>
+            <a:r>
+              <a:rPr lang="en-US" dirty="0"/>
+              <a:t>How to find Salesforce custom apps</a:t>
+            </a:r>
+          </a:p>
+          <a:p>
+            <a:pPr lvl="1"/>
+            <a:r>
+              <a:rPr lang="en-US" dirty="0"/>
+              <a:t>Searching the app menu</a:t>
+            </a:r>
+          </a:p>
+          <a:p>
+            <a:pPr lvl="1"/>
+            <a:r>
+              <a:rPr lang="en-US" dirty="0"/>
+              <a:t>Common pen test issue – missing licenses</a:t>
+            </a:r>
+          </a:p>
+          <a:p>
+            <a:r>
+              <a:rPr lang="en-US" dirty="0"/>
+              <a:t>Test data setup walkthrough</a:t>
+            </a:r>
+          </a:p>
+          <a:p>
+            <a:pPr lvl="1"/>
+            <a:r>
+              <a:rPr lang="en-US" dirty="0"/>
+              <a:t>from INSTALL.md</a:t>
+            </a:r>
+          </a:p>
+          <a:p>
+            <a:r>
+              <a:rPr lang="en-US" dirty="0"/>
+              <a:t>Login as the unprivileged user</a:t>
+            </a:r>
+          </a:p>
+          <a:p>
+            <a:r>
+              <a:rPr lang="en-US" dirty="0"/>
+              <a:t>Documentation hints</a:t>
+            </a:r>
+          </a:p>
+          <a:p>
+            <a:pPr lvl="1"/>
+            <a:r>
+              <a:rPr lang="en-US" dirty="0"/>
+              <a:t>Explain how to things work in Salesforce</a:t>
+            </a:r>
+          </a:p>
+          <a:p>
+            <a:pPr lvl="1"/>
+            <a:r>
+              <a:rPr lang="en-US" dirty="0"/>
+              <a:t>Tips for AppSec pen testing</a:t>
+            </a:r>
+          </a:p>
+        </p:txBody>
+      </p:sp>
+    </p:spTree>
+    <p:extLst>
+      <p:ext uri="{BB962C8B-B14F-4D97-AF65-F5344CB8AC3E}">
+        <p14:creationId xmlns:p14="http://schemas.microsoft.com/office/powerpoint/2010/main" val="2544472023"/>
+      </p:ext>
+    </p:extLst>
+  </p:cSld>
+  <p:clrMapOvr>
+    <a:masterClrMapping/>
+  </p:clrMapOvr>
+</p:sld>
+</file>
+
+<file path=ppt/slides/slide12.xml><?xml version="1.0" encoding="utf-8"?>
+<p:sld xmlns:a="http://schemas.openxmlformats.org/drawingml/2006/main" xmlns:r="http://schemas.openxmlformats.org/officeDocument/2006/relationships" xmlns:p="http://schemas.openxmlformats.org/presentationml/2006/main">
+  <p:cSld>
+    <p:spTree>
+      <p:nvGrpSpPr>
+        <p:cNvPr id="1" name=""/>
+        <p:cNvGrpSpPr/>
+        <p:nvPr/>
+      </p:nvGrpSpPr>
+      <p:grpSpPr>
+        <a:xfrm>
+          <a:off x="0" y="0"/>
+          <a:ext cx="0" cy="0"/>
+          <a:chOff x="0" y="0"/>
+          <a:chExt cx="0" cy="0"/>
+        </a:xfrm>
+      </p:grpSpPr>
+      <p:sp>
+        <p:nvSpPr>
+          <p:cNvPr id="2" name="Title 1">
+            <a:extLst>
+              <a:ext uri="{FF2B5EF4-FFF2-40B4-BE49-F238E27FC236}">
+                <a16:creationId xmlns:a16="http://schemas.microsoft.com/office/drawing/2014/main" id="{21C79B63-B1A9-BC91-8E8C-4884DA6358F2}"/>
+              </a:ext>
+            </a:extLst>
+          </p:cNvPr>
+          <p:cNvSpPr>
+            <a:spLocks noGrp="1"/>
+          </p:cNvSpPr>
+          <p:nvPr>
+            <p:ph type="title"/>
+          </p:nvPr>
+        </p:nvSpPr>
+        <p:spPr/>
+        <p:txBody>
+          <a:bodyPr/>
+          <a:lstStyle/>
+          <a:p>
+            <a:r>
+              <a:rPr lang="en-US" dirty="0"/>
+              <a:t>Lightning (LWC) vs Apex</a:t>
+            </a:r>
+          </a:p>
+        </p:txBody>
+      </p:sp>
+      <p:sp>
+        <p:nvSpPr>
+          <p:cNvPr id="3" name="Content Placeholder 2">
+            <a:extLst>
+              <a:ext uri="{FF2B5EF4-FFF2-40B4-BE49-F238E27FC236}">
+                <a16:creationId xmlns:a16="http://schemas.microsoft.com/office/drawing/2014/main" id="{DB2402F1-EADD-5C1C-DBA4-908BA58D3DD8}"/>
+              </a:ext>
+            </a:extLst>
+          </p:cNvPr>
+          <p:cNvSpPr>
+            <a:spLocks noGrp="1"/>
+          </p:cNvSpPr>
+          <p:nvPr>
+            <p:ph idx="1"/>
+          </p:nvPr>
+        </p:nvSpPr>
+        <p:spPr/>
+        <p:txBody>
+          <a:bodyPr/>
+          <a:lstStyle/>
+          <a:p>
+            <a:r>
+              <a:rPr lang="en-US" dirty="0" err="1"/>
+              <a:t>VisualForce</a:t>
+            </a:r>
+            <a:r>
+              <a:rPr lang="en-US" dirty="0"/>
+              <a:t> = page frontend markup</a:t>
+            </a:r>
+          </a:p>
+          <a:p>
+            <a:r>
+              <a:rPr lang="en-US" dirty="0"/>
+              <a:t>Apex = backend controller</a:t>
+            </a:r>
+          </a:p>
+          <a:p>
+            <a:r>
+              <a:rPr lang="en-US" dirty="0"/>
+              <a:t>Lightning = more modern page framework</a:t>
+            </a:r>
+          </a:p>
+          <a:p>
+            <a:pPr lvl="1"/>
+            <a:r>
+              <a:rPr lang="en-US" dirty="0"/>
+              <a:t>Replaces Salesforce Classic UI</a:t>
+            </a:r>
+          </a:p>
+          <a:p>
+            <a:pPr lvl="1"/>
+            <a:r>
+              <a:rPr lang="en-US" dirty="0"/>
+              <a:t>More AJAX or client-side heavy</a:t>
+            </a:r>
+          </a:p>
+          <a:p>
+            <a:pPr lvl="1"/>
+            <a:r>
+              <a:rPr lang="en-US" dirty="0"/>
+              <a:t>Still uses Apex (and optionally) </a:t>
+            </a:r>
+            <a:r>
+              <a:rPr lang="en-US" dirty="0" err="1"/>
+              <a:t>VisualForce</a:t>
+            </a:r>
+            <a:endParaRPr lang="en-US" dirty="0"/>
+          </a:p>
+          <a:p>
+            <a:r>
+              <a:rPr lang="en-US" dirty="0"/>
+              <a:t>URLs for </a:t>
+            </a:r>
+            <a:r>
+              <a:rPr lang="en-US" dirty="0" err="1"/>
+              <a:t>pentesting</a:t>
+            </a:r>
+            <a:endParaRPr lang="en-US" dirty="0"/>
+          </a:p>
+          <a:p>
+            <a:pPr lvl="1"/>
+            <a:r>
+              <a:rPr lang="en-US" dirty="0"/>
+              <a:t>Lightning = https://</a:t>
+            </a:r>
+            <a:r>
+              <a:rPr lang="en-US" i="1" dirty="0"/>
+              <a:t>org</a:t>
+            </a:r>
+            <a:r>
+              <a:rPr lang="en-US" dirty="0"/>
+              <a:t>.develop.lightning.force.com/</a:t>
+            </a:r>
+            <a:r>
+              <a:rPr lang="en-US" b="1" dirty="0">
+                <a:highlight>
+                  <a:srgbClr val="FFFF00"/>
+                </a:highlight>
+              </a:rPr>
+              <a:t>lightning</a:t>
+            </a:r>
+            <a:r>
+              <a:rPr lang="en-US" b="1" dirty="0"/>
+              <a:t>/n</a:t>
+            </a:r>
+            <a:r>
+              <a:rPr lang="en-US" dirty="0"/>
+              <a:t>/XSS2</a:t>
+            </a:r>
+          </a:p>
+          <a:p>
+            <a:pPr lvl="1"/>
+            <a:r>
+              <a:rPr lang="en-US" dirty="0"/>
+              <a:t>Apex(Classic) = https://</a:t>
+            </a:r>
+            <a:r>
+              <a:rPr lang="en-US" i="1" dirty="0"/>
+              <a:t>org</a:t>
+            </a:r>
+            <a:r>
+              <a:rPr lang="en-US" dirty="0"/>
+              <a:t>.develop.vf.force.com/</a:t>
+            </a:r>
+            <a:r>
+              <a:rPr lang="en-US" b="1" dirty="0">
+                <a:highlight>
+                  <a:srgbClr val="FFFF00"/>
+                </a:highlight>
+              </a:rPr>
+              <a:t>apex</a:t>
+            </a:r>
+            <a:r>
+              <a:rPr lang="en-US" dirty="0"/>
+              <a:t>/XSS2</a:t>
+            </a:r>
+          </a:p>
+        </p:txBody>
+      </p:sp>
+    </p:spTree>
+    <p:extLst>
+      <p:ext uri="{BB962C8B-B14F-4D97-AF65-F5344CB8AC3E}">
+        <p14:creationId xmlns:p14="http://schemas.microsoft.com/office/powerpoint/2010/main" val="3008516458"/>
+      </p:ext>
+    </p:extLst>
+  </p:cSld>
+  <p:clrMapOvr>
+    <a:masterClrMapping/>
+  </p:clrMapOvr>
+</p:sld>
+</file>
+
+<file path=ppt/slides/slide13.xml><?xml version="1.0" encoding="utf-8"?>
+<p:sld xmlns:a="http://schemas.openxmlformats.org/drawingml/2006/main" xmlns:r="http://schemas.openxmlformats.org/officeDocument/2006/relationships" xmlns:p="http://schemas.openxmlformats.org/presentationml/2006/main">
+  <p:cSld>
+    <p:spTree>
+      <p:nvGrpSpPr>
+        <p:cNvPr id="1" name=""/>
+        <p:cNvGrpSpPr/>
+        <p:nvPr/>
+      </p:nvGrpSpPr>
+      <p:grpSpPr>
+        <a:xfrm>
+          <a:off x="0" y="0"/>
+          <a:ext cx="0" cy="0"/>
+          <a:chOff x="0" y="0"/>
+          <a:chExt cx="0" cy="0"/>
+        </a:xfrm>
+      </p:grpSpPr>
+      <p:sp>
+        <p:nvSpPr>
+          <p:cNvPr id="2" name="Title 1">
+            <a:extLst>
+              <a:ext uri="{FF2B5EF4-FFF2-40B4-BE49-F238E27FC236}">
                 <a16:creationId xmlns:a16="http://schemas.microsoft.com/office/drawing/2014/main" id="{1D6E31A5-86F9-AAA2-52DF-7AF1CFFCF6F6}"/>
               </a:ext>
             </a:extLst>
@@ -3001,7 +3341,7 @@
 </p:sld>
 </file>
 
-<file path=ppt/slides/slide12.xml><?xml version="1.0" encoding="utf-8"?>
+<file path=ppt/slides/slide14.xml><?xml version="1.0" encoding="utf-8"?>
 <p:sld xmlns:a="http://schemas.openxmlformats.org/drawingml/2006/main" xmlns:r="http://schemas.openxmlformats.org/officeDocument/2006/relationships" xmlns:p="http://schemas.openxmlformats.org/presentationml/2006/main">
   <p:cSld>
     <p:spTree>

</xml_diff>

<commit_message>
Replaced sfdx with new sf command
</commit_message>
<xml_diff>
--- a/Documentation/BSides Austin - December 2024 - Rodney Beede.pptx
+++ b/Documentation/BSides Austin - December 2024 - Rodney Beede.pptx
@@ -299,7 +299,7 @@
           <a:p>
             <a:fld id="{E4031F5C-5DB9-4B09-A30C-C771D7AF3346}" type="datetimeFigureOut">
               <a:rPr lang="en-US" smtClean="0"/>
-              <a:t>10/14/2024</a:t>
+              <a:t>11/21/2024</a:t>
             </a:fld>
             <a:endParaRPr lang="en-US"/>
           </a:p>
@@ -497,7 +497,7 @@
           <a:p>
             <a:fld id="{E4031F5C-5DB9-4B09-A30C-C771D7AF3346}" type="datetimeFigureOut">
               <a:rPr lang="en-US" smtClean="0"/>
-              <a:t>10/14/2024</a:t>
+              <a:t>11/21/2024</a:t>
             </a:fld>
             <a:endParaRPr lang="en-US"/>
           </a:p>
@@ -772,7 +772,7 @@
           <a:p>
             <a:fld id="{E4031F5C-5DB9-4B09-A30C-C771D7AF3346}" type="datetimeFigureOut">
               <a:rPr lang="en-US" smtClean="0"/>
-              <a:t>10/14/2024</a:t>
+              <a:t>11/21/2024</a:t>
             </a:fld>
             <a:endParaRPr lang="en-US"/>
           </a:p>
@@ -1037,7 +1037,7 @@
           <a:p>
             <a:fld id="{E4031F5C-5DB9-4B09-A30C-C771D7AF3346}" type="datetimeFigureOut">
               <a:rPr lang="en-US" smtClean="0"/>
-              <a:t>10/14/2024</a:t>
+              <a:t>11/21/2024</a:t>
             </a:fld>
             <a:endParaRPr lang="en-US"/>
           </a:p>
@@ -1449,7 +1449,7 @@
           <a:p>
             <a:fld id="{E4031F5C-5DB9-4B09-A30C-C771D7AF3346}" type="datetimeFigureOut">
               <a:rPr lang="en-US" smtClean="0"/>
-              <a:t>10/14/2024</a:t>
+              <a:t>11/21/2024</a:t>
             </a:fld>
             <a:endParaRPr lang="en-US"/>
           </a:p>
@@ -1590,7 +1590,7 @@
           <a:p>
             <a:fld id="{E4031F5C-5DB9-4B09-A30C-C771D7AF3346}" type="datetimeFigureOut">
               <a:rPr lang="en-US" smtClean="0"/>
-              <a:t>10/14/2024</a:t>
+              <a:t>11/21/2024</a:t>
             </a:fld>
             <a:endParaRPr lang="en-US"/>
           </a:p>
@@ -1703,7 +1703,7 @@
           <a:p>
             <a:fld id="{E4031F5C-5DB9-4B09-A30C-C771D7AF3346}" type="datetimeFigureOut">
               <a:rPr lang="en-US" smtClean="0"/>
-              <a:t>10/14/2024</a:t>
+              <a:t>11/21/2024</a:t>
             </a:fld>
             <a:endParaRPr lang="en-US"/>
           </a:p>
@@ -2014,7 +2014,7 @@
           <a:p>
             <a:fld id="{E4031F5C-5DB9-4B09-A30C-C771D7AF3346}" type="datetimeFigureOut">
               <a:rPr lang="en-US" smtClean="0"/>
-              <a:t>10/14/2024</a:t>
+              <a:t>11/21/2024</a:t>
             </a:fld>
             <a:endParaRPr lang="en-US"/>
           </a:p>
@@ -2255,7 +2255,7 @@
           <a:p>
             <a:fld id="{E4031F5C-5DB9-4B09-A30C-C771D7AF3346}" type="datetimeFigureOut">
               <a:rPr lang="en-US" smtClean="0"/>
-              <a:t>10/14/2024</a:t>
+              <a:t>11/21/2024</a:t>
             </a:fld>
             <a:endParaRPr lang="en-US"/>
           </a:p>
@@ -5201,8 +5201,8 @@
               <a:buNone/>
             </a:pPr>
             <a:r>
-              <a:rPr lang="fr-FR" dirty="0"/>
-              <a:t>sfdx force:source:deploy -p force-app\main</a:t>
+              <a:rPr lang="en-US"/>
+              <a:t>sf project deploy start --ignore-conflicts --wait 10</a:t>
             </a:r>
             <a:endParaRPr lang="en-US" dirty="0"/>
           </a:p>
@@ -5223,45 +5223,20 @@
           <p:nvPr/>
         </p:nvPicPr>
         <p:blipFill>
-          <a:blip r:embed="rId2"/>
-          <a:stretch>
-            <a:fillRect/>
-          </a:stretch>
+          <a:blip r:embed="rId2" cstate="print">
+            <a:extLst>
+              <a:ext uri="{28A0092B-C50C-407E-A947-70E740481C1C}">
+                <a14:useLocalDpi xmlns:a14="http://schemas.microsoft.com/office/drawing/2010/main" val="0"/>
+              </a:ext>
+            </a:extLst>
+          </a:blip>
+          <a:srcRect/>
+          <a:stretch/>
         </p:blipFill>
         <p:spPr>
           <a:xfrm>
-            <a:off x="666471" y="2446313"/>
-            <a:ext cx="10859058" cy="2844946"/>
-          </a:xfrm>
-          <a:prstGeom prst="rect">
-            <a:avLst/>
-          </a:prstGeom>
-        </p:spPr>
-      </p:pic>
-      <p:pic>
-        <p:nvPicPr>
-          <p:cNvPr id="10" name="Picture 9">
-            <a:extLst>
-              <a:ext uri="{FF2B5EF4-FFF2-40B4-BE49-F238E27FC236}">
-                <a16:creationId xmlns:a16="http://schemas.microsoft.com/office/drawing/2014/main" id="{03C4AC19-9764-DAE1-C3EB-1DC69FF0FF1E}"/>
-              </a:ext>
-            </a:extLst>
-          </p:cNvPr>
-          <p:cNvPicPr>
-            <a:picLocks noChangeAspect="1"/>
-          </p:cNvPicPr>
-          <p:nvPr/>
-        </p:nvPicPr>
-        <p:blipFill>
-          <a:blip r:embed="rId3"/>
-          <a:stretch>
-            <a:fillRect/>
-          </a:stretch>
-        </p:blipFill>
-        <p:spPr>
-          <a:xfrm>
-            <a:off x="698222" y="5390484"/>
-            <a:ext cx="10795555" cy="1441524"/>
+            <a:off x="2230551" y="2446312"/>
+            <a:ext cx="7730899" cy="4411687"/>
           </a:xfrm>
           <a:prstGeom prst="rect">
             <a:avLst/>

</xml_diff>